<commit_message>
Arquivo modificado por aluno
</commit_message>
<xml_diff>
--- a/Atividade de controle de versoes.pptx
+++ b/Atividade de controle de versoes.pptx
@@ -2,13 +2,13 @@
 <file path=ppt/presentation.xml><?xml version="1.0" encoding="utf-8"?>
 <p:presentation xmlns:a="http://schemas.openxmlformats.org/drawingml/2006/main" xmlns:r="http://schemas.openxmlformats.org/officeDocument/2006/relationships" xmlns:p="http://schemas.openxmlformats.org/presentationml/2006/main" autoCompressPictures="0">
   <p:sldMasterIdLst>
-    <p:sldMasterId id="2147483733" r:id="rId1"/>
+    <p:sldMasterId id="2147483648" r:id="rId1"/>
   </p:sldMasterIdLst>
   <p:sldIdLst>
-    <p:sldId id="256" r:id="rId2"/>
-    <p:sldId id="264" r:id="rId3"/>
-    <p:sldId id="257" r:id="rId4"/>
-    <p:sldId id="265" r:id="rId5"/>
+    <p:sldId id="256" r:id="rId3"/>
+    <p:sldId id="264" r:id="rId4"/>
+    <p:sldId id="257" r:id="rId5"/>
+    <p:sldId id="265" r:id="rId6"/>
   </p:sldIdLst>
   <p:sldSz cx="9144000" cy="6858000" type="screen4x3"/>
   <p:notesSz cx="6858000" cy="9144000"/>
@@ -107,11 +107,6 @@
       </a:defRPr>
     </a:lvl9pPr>
   </p:defaultTextStyle>
-  <p:extLst>
-    <p:ext uri="{EFAFB233-063F-42B5-8137-9DF3F51BA10A}">
-      <p15:sldGuideLst xmlns:p15="http://schemas.microsoft.com/office/powerpoint/2012/main"/>
-    </p:ext>
-  </p:extLst>
 </p:presentation>
 </file>
 
@@ -278,8 +273,6 @@
           <a:p>
             <a:fld id="{08B9EBBA-996F-894A-B54A-D6246ED52CEA}" type="datetimeFigureOut">
               <a:rPr lang="en-US" smtClean="0"/>
-              <a:pPr/>
-              <a:t>3/31/2021</a:t>
             </a:fld>
             <a:endParaRPr lang="en-US" dirty="0"/>
           </a:p>
@@ -321,19 +314,12 @@
           <a:p>
             <a:fld id="{D57F1E4F-1CFF-5643-939E-217C01CDF565}" type="slidenum">
               <a:rPr lang="en-US" smtClean="0"/>
-              <a:pPr/>
-              <a:t>‹nº›</a:t>
             </a:fld>
             <a:endParaRPr lang="en-US" dirty="0"/>
           </a:p>
         </p:txBody>
       </p:sp>
     </p:spTree>
-    <p:extLst>
-      <p:ext uri="{BB962C8B-B14F-4D97-AF65-F5344CB8AC3E}">
-        <p14:creationId xmlns:p14="http://schemas.microsoft.com/office/powerpoint/2010/main" val="1892953248"/>
-      </p:ext>
-    </p:extLst>
   </p:cSld>
   <p:clrMapOvr>
     <a:overrideClrMapping bg1="dk1" tx1="lt1" bg2="dk2" tx2="lt2" accent1="accent1" accent2="accent2" accent3="accent3" accent4="accent4" accent5="accent5" accent6="accent6" hlink="hlink" folHlink="folHlink"/>
@@ -401,6 +387,7 @@
               <a:rPr lang="en-US"/>
               <a:t>Click to edit Master text styles</a:t>
             </a:r>
+            <a:endParaRPr lang="en-US"/>
           </a:p>
           <a:p>
             <a:pPr lvl="1"/>
@@ -408,6 +395,7 @@
               <a:rPr lang="en-US"/>
               <a:t>Second level</a:t>
             </a:r>
+            <a:endParaRPr lang="en-US"/>
           </a:p>
           <a:p>
             <a:pPr lvl="2"/>
@@ -415,6 +403,7 @@
               <a:rPr lang="en-US"/>
               <a:t>Third level</a:t>
             </a:r>
+            <a:endParaRPr lang="en-US"/>
           </a:p>
           <a:p>
             <a:pPr lvl="3"/>
@@ -422,6 +411,7 @@
               <a:rPr lang="en-US"/>
               <a:t>Fourth level</a:t>
             </a:r>
+            <a:endParaRPr lang="en-US"/>
           </a:p>
           <a:p>
             <a:pPr lvl="4"/>
@@ -450,8 +440,6 @@
           <a:p>
             <a:fld id="{C6C52C72-DE31-F449-A4ED-4C594FD91407}" type="datetimeFigureOut">
               <a:rPr lang="en-US" smtClean="0"/>
-              <a:pPr/>
-              <a:t>3/31/2021</a:t>
             </a:fld>
             <a:endParaRPr lang="en-US" dirty="0"/>
           </a:p>
@@ -493,19 +481,12 @@
           <a:p>
             <a:fld id="{D57F1E4F-1CFF-5643-939E-217C01CDF565}" type="slidenum">
               <a:rPr lang="en-US" smtClean="0"/>
-              <a:pPr/>
-              <a:t>‹nº›</a:t>
             </a:fld>
             <a:endParaRPr lang="en-US" dirty="0"/>
           </a:p>
         </p:txBody>
       </p:sp>
     </p:spTree>
-    <p:extLst>
-      <p:ext uri="{BB962C8B-B14F-4D97-AF65-F5344CB8AC3E}">
-        <p14:creationId xmlns:p14="http://schemas.microsoft.com/office/powerpoint/2010/main" val="1121449170"/>
-      </p:ext>
-    </p:extLst>
   </p:cSld>
   <p:clrMapOvr>
     <a:masterClrMapping/>
@@ -583,6 +564,7 @@
               <a:rPr lang="en-US"/>
               <a:t>Click to edit Master text styles</a:t>
             </a:r>
+            <a:endParaRPr lang="en-US"/>
           </a:p>
           <a:p>
             <a:pPr lvl="1"/>
@@ -590,6 +572,7 @@
               <a:rPr lang="en-US"/>
               <a:t>Second level</a:t>
             </a:r>
+            <a:endParaRPr lang="en-US"/>
           </a:p>
           <a:p>
             <a:pPr lvl="2"/>
@@ -597,6 +580,7 @@
               <a:rPr lang="en-US"/>
               <a:t>Third level</a:t>
             </a:r>
+            <a:endParaRPr lang="en-US"/>
           </a:p>
           <a:p>
             <a:pPr lvl="3"/>
@@ -604,6 +588,7 @@
               <a:rPr lang="en-US"/>
               <a:t>Fourth level</a:t>
             </a:r>
+            <a:endParaRPr lang="en-US"/>
           </a:p>
           <a:p>
             <a:pPr lvl="4"/>
@@ -632,8 +617,6 @@
           <a:p>
             <a:fld id="{ED62726E-379B-B349-9EED-81ED093FA806}" type="datetimeFigureOut">
               <a:rPr lang="en-US" smtClean="0"/>
-              <a:pPr/>
-              <a:t>3/31/2021</a:t>
             </a:fld>
             <a:endParaRPr lang="en-US" dirty="0"/>
           </a:p>
@@ -675,19 +658,12 @@
           <a:p>
             <a:fld id="{D57F1E4F-1CFF-5643-939E-217C01CDF565}" type="slidenum">
               <a:rPr lang="en-US" smtClean="0"/>
-              <a:pPr/>
-              <a:t>‹nº›</a:t>
             </a:fld>
             <a:endParaRPr lang="en-US" dirty="0"/>
           </a:p>
         </p:txBody>
       </p:sp>
     </p:spTree>
-    <p:extLst>
-      <p:ext uri="{BB962C8B-B14F-4D97-AF65-F5344CB8AC3E}">
-        <p14:creationId xmlns:p14="http://schemas.microsoft.com/office/powerpoint/2010/main" val="1140926612"/>
-      </p:ext>
-    </p:extLst>
   </p:cSld>
   <p:clrMapOvr>
     <a:masterClrMapping/>
@@ -755,6 +731,7 @@
               <a:rPr lang="en-US"/>
               <a:t>Click to edit Master text styles</a:t>
             </a:r>
+            <a:endParaRPr lang="en-US"/>
           </a:p>
           <a:p>
             <a:pPr lvl="1"/>
@@ -762,6 +739,7 @@
               <a:rPr lang="en-US"/>
               <a:t>Second level</a:t>
             </a:r>
+            <a:endParaRPr lang="en-US"/>
           </a:p>
           <a:p>
             <a:pPr lvl="2"/>
@@ -769,6 +747,7 @@
               <a:rPr lang="en-US"/>
               <a:t>Third level</a:t>
             </a:r>
+            <a:endParaRPr lang="en-US"/>
           </a:p>
           <a:p>
             <a:pPr lvl="3"/>
@@ -776,6 +755,7 @@
               <a:rPr lang="en-US"/>
               <a:t>Fourth level</a:t>
             </a:r>
+            <a:endParaRPr lang="en-US"/>
           </a:p>
           <a:p>
             <a:pPr lvl="4"/>
@@ -804,8 +784,6 @@
           <a:p>
             <a:fld id="{9B3A1323-8D79-1946-B0D7-40001CF92E9D}" type="datetimeFigureOut">
               <a:rPr lang="en-US" smtClean="0"/>
-              <a:pPr/>
-              <a:t>3/31/2021</a:t>
             </a:fld>
             <a:endParaRPr lang="en-US" dirty="0"/>
           </a:p>
@@ -847,19 +825,12 @@
           <a:p>
             <a:fld id="{D57F1E4F-1CFF-5643-939E-217C01CDF565}" type="slidenum">
               <a:rPr lang="en-US" smtClean="0"/>
-              <a:pPr/>
-              <a:t>‹nº›</a:t>
             </a:fld>
             <a:endParaRPr lang="en-US" dirty="0"/>
           </a:p>
         </p:txBody>
       </p:sp>
     </p:spTree>
-    <p:extLst>
-      <p:ext uri="{BB962C8B-B14F-4D97-AF65-F5344CB8AC3E}">
-        <p14:creationId xmlns:p14="http://schemas.microsoft.com/office/powerpoint/2010/main" val="115591777"/>
-      </p:ext>
-    </p:extLst>
   </p:cSld>
   <p:clrMapOvr>
     <a:masterClrMapping/>
@@ -1054,6 +1025,7 @@
               <a:rPr lang="en-US"/>
               <a:t>Click to edit Master text styles</a:t>
             </a:r>
+            <a:endParaRPr lang="en-US"/>
           </a:p>
         </p:txBody>
       </p:sp>
@@ -1074,8 +1046,6 @@
           <a:p>
             <a:fld id="{8DFA1846-DA80-1C48-A609-854EA85C59AD}" type="datetimeFigureOut">
               <a:rPr lang="en-US" smtClean="0"/>
-              <a:pPr/>
-              <a:t>3/31/2021</a:t>
             </a:fld>
             <a:endParaRPr lang="en-US" dirty="0"/>
           </a:p>
@@ -1117,19 +1087,12 @@
           <a:p>
             <a:fld id="{D57F1E4F-1CFF-5643-939E-217C01CDF565}" type="slidenum">
               <a:rPr lang="en-US" smtClean="0"/>
-              <a:pPr/>
-              <a:t>‹nº›</a:t>
             </a:fld>
             <a:endParaRPr lang="en-US" dirty="0"/>
           </a:p>
         </p:txBody>
       </p:sp>
     </p:spTree>
-    <p:extLst>
-      <p:ext uri="{BB962C8B-B14F-4D97-AF65-F5344CB8AC3E}">
-        <p14:creationId xmlns:p14="http://schemas.microsoft.com/office/powerpoint/2010/main" val="3245709524"/>
-      </p:ext>
-    </p:extLst>
   </p:cSld>
   <p:clrMapOvr>
     <a:overrideClrMapping bg1="dk1" tx1="lt1" bg2="dk2" tx2="lt2" accent1="accent1" accent2="accent2" accent3="accent3" accent4="accent4" accent5="accent5" accent6="accent6" hlink="hlink" folHlink="folHlink"/>
@@ -1202,6 +1165,7 @@
               <a:rPr lang="en-US"/>
               <a:t>Click to edit Master text styles</a:t>
             </a:r>
+            <a:endParaRPr lang="en-US"/>
           </a:p>
           <a:p>
             <a:pPr lvl="1"/>
@@ -1209,6 +1173,7 @@
               <a:rPr lang="en-US"/>
               <a:t>Second level</a:t>
             </a:r>
+            <a:endParaRPr lang="en-US"/>
           </a:p>
           <a:p>
             <a:pPr lvl="2"/>
@@ -1216,6 +1181,7 @@
               <a:rPr lang="en-US"/>
               <a:t>Third level</a:t>
             </a:r>
+            <a:endParaRPr lang="en-US"/>
           </a:p>
           <a:p>
             <a:pPr lvl="3"/>
@@ -1223,6 +1189,7 @@
               <a:rPr lang="en-US"/>
               <a:t>Fourth level</a:t>
             </a:r>
+            <a:endParaRPr lang="en-US"/>
           </a:p>
           <a:p>
             <a:pPr lvl="4"/>
@@ -1259,6 +1226,7 @@
               <a:rPr lang="en-US"/>
               <a:t>Click to edit Master text styles</a:t>
             </a:r>
+            <a:endParaRPr lang="en-US"/>
           </a:p>
           <a:p>
             <a:pPr lvl="1"/>
@@ -1266,6 +1234,7 @@
               <a:rPr lang="en-US"/>
               <a:t>Second level</a:t>
             </a:r>
+            <a:endParaRPr lang="en-US"/>
           </a:p>
           <a:p>
             <a:pPr lvl="2"/>
@@ -1273,6 +1242,7 @@
               <a:rPr lang="en-US"/>
               <a:t>Third level</a:t>
             </a:r>
+            <a:endParaRPr lang="en-US"/>
           </a:p>
           <a:p>
             <a:pPr lvl="3"/>
@@ -1280,6 +1250,7 @@
               <a:rPr lang="en-US"/>
               <a:t>Fourth level</a:t>
             </a:r>
+            <a:endParaRPr lang="en-US"/>
           </a:p>
           <a:p>
             <a:pPr lvl="4"/>
@@ -1308,8 +1279,6 @@
           <a:p>
             <a:fld id="{57302355-E14B-8545-A8F8-0FE83CC9D524}" type="datetimeFigureOut">
               <a:rPr lang="en-US" smtClean="0"/>
-              <a:pPr/>
-              <a:t>3/31/2021</a:t>
             </a:fld>
             <a:endParaRPr lang="en-US" dirty="0"/>
           </a:p>
@@ -1351,19 +1320,12 @@
           <a:p>
             <a:fld id="{D57F1E4F-1CFF-5643-939E-217C01CDF565}" type="slidenum">
               <a:rPr lang="en-US" smtClean="0"/>
-              <a:pPr/>
-              <a:t>‹nº›</a:t>
             </a:fld>
             <a:endParaRPr lang="en-US" dirty="0"/>
           </a:p>
         </p:txBody>
       </p:sp>
     </p:spTree>
-    <p:extLst>
-      <p:ext uri="{BB962C8B-B14F-4D97-AF65-F5344CB8AC3E}">
-        <p14:creationId xmlns:p14="http://schemas.microsoft.com/office/powerpoint/2010/main" val="3217210692"/>
-      </p:ext>
-    </p:extLst>
   </p:cSld>
   <p:clrMapOvr>
     <a:masterClrMapping/>
@@ -1458,6 +1420,7 @@
               <a:rPr lang="en-US"/>
               <a:t>Click to edit Master text styles</a:t>
             </a:r>
+            <a:endParaRPr lang="en-US"/>
           </a:p>
         </p:txBody>
       </p:sp>
@@ -1486,6 +1449,7 @@
               <a:rPr lang="en-US"/>
               <a:t>Click to edit Master text styles</a:t>
             </a:r>
+            <a:endParaRPr lang="en-US"/>
           </a:p>
           <a:p>
             <a:pPr lvl="1"/>
@@ -1493,6 +1457,7 @@
               <a:rPr lang="en-US"/>
               <a:t>Second level</a:t>
             </a:r>
+            <a:endParaRPr lang="en-US"/>
           </a:p>
           <a:p>
             <a:pPr lvl="2"/>
@@ -1500,6 +1465,7 @@
               <a:rPr lang="en-US"/>
               <a:t>Third level</a:t>
             </a:r>
+            <a:endParaRPr lang="en-US"/>
           </a:p>
           <a:p>
             <a:pPr lvl="3"/>
@@ -1507,6 +1473,7 @@
               <a:rPr lang="en-US"/>
               <a:t>Fourth level</a:t>
             </a:r>
+            <a:endParaRPr lang="en-US"/>
           </a:p>
           <a:p>
             <a:pPr lvl="4"/>
@@ -1547,6 +1514,7 @@
               <a:rPr lang="en-US"/>
               <a:t>Click to edit Master text styles</a:t>
             </a:r>
+            <a:endParaRPr lang="en-US"/>
           </a:p>
           <a:p>
             <a:pPr lvl="1"/>
@@ -1554,6 +1522,7 @@
               <a:rPr lang="en-US"/>
               <a:t>Second level</a:t>
             </a:r>
+            <a:endParaRPr lang="en-US"/>
           </a:p>
           <a:p>
             <a:pPr lvl="2"/>
@@ -1561,6 +1530,7 @@
               <a:rPr lang="en-US"/>
               <a:t>Third level</a:t>
             </a:r>
+            <a:endParaRPr lang="en-US"/>
           </a:p>
           <a:p>
             <a:pPr lvl="3"/>
@@ -1568,6 +1538,7 @@
               <a:rPr lang="en-US"/>
               <a:t>Fourth level</a:t>
             </a:r>
+            <a:endParaRPr lang="en-US"/>
           </a:p>
           <a:p>
             <a:pPr lvl="4"/>
@@ -1649,6 +1620,7 @@
               <a:rPr lang="en-US"/>
               <a:t>Click to edit Master text styles</a:t>
             </a:r>
+            <a:endParaRPr lang="en-US"/>
           </a:p>
         </p:txBody>
       </p:sp>
@@ -1669,8 +1641,6 @@
           <a:p>
             <a:fld id="{09B482E8-6E0E-1B4F-B1FD-C69DB9E858D9}" type="datetimeFigureOut">
               <a:rPr lang="en-US" smtClean="0"/>
-              <a:pPr/>
-              <a:t>3/31/2021</a:t>
             </a:fld>
             <a:endParaRPr lang="en-US" dirty="0"/>
           </a:p>
@@ -1712,8 +1682,6 @@
           <a:p>
             <a:fld id="{D57F1E4F-1CFF-5643-939E-217C01CDF565}" type="slidenum">
               <a:rPr lang="en-US" smtClean="0"/>
-              <a:pPr/>
-              <a:t>‹nº›</a:t>
             </a:fld>
             <a:endParaRPr lang="en-US" dirty="0"/>
           </a:p>
@@ -1743,11 +1711,6 @@
         </p:txBody>
       </p:sp>
     </p:spTree>
-    <p:extLst>
-      <p:ext uri="{BB962C8B-B14F-4D97-AF65-F5344CB8AC3E}">
-        <p14:creationId xmlns:p14="http://schemas.microsoft.com/office/powerpoint/2010/main" val="2837283999"/>
-      </p:ext>
-    </p:extLst>
   </p:cSld>
   <p:clrMapOvr>
     <a:masterClrMapping/>
@@ -1813,8 +1776,6 @@
           <a:p>
             <a:fld id="{F13A34C8-038E-2045-AF43-DF7DBB8E0E9E}" type="datetimeFigureOut">
               <a:rPr lang="en-US" smtClean="0"/>
-              <a:pPr/>
-              <a:t>3/31/2021</a:t>
             </a:fld>
             <a:endParaRPr lang="en-US" dirty="0"/>
           </a:p>
@@ -1856,19 +1817,12 @@
           <a:p>
             <a:fld id="{D57F1E4F-1CFF-5643-939E-217C01CDF565}" type="slidenum">
               <a:rPr lang="en-US" smtClean="0"/>
-              <a:pPr/>
-              <a:t>‹nº›</a:t>
             </a:fld>
             <a:endParaRPr lang="en-US" dirty="0"/>
           </a:p>
         </p:txBody>
       </p:sp>
     </p:spTree>
-    <p:extLst>
-      <p:ext uri="{BB962C8B-B14F-4D97-AF65-F5344CB8AC3E}">
-        <p14:creationId xmlns:p14="http://schemas.microsoft.com/office/powerpoint/2010/main" val="3392360087"/>
-      </p:ext>
-    </p:extLst>
   </p:cSld>
   <p:clrMapOvr>
     <a:masterClrMapping/>
@@ -1910,8 +1864,6 @@
           <a:p>
             <a:fld id="{8818C68F-D26B-8F47-958C-23B49CF8A634}" type="datetimeFigureOut">
               <a:rPr lang="en-US" smtClean="0"/>
-              <a:pPr/>
-              <a:t>3/31/2021</a:t>
             </a:fld>
             <a:endParaRPr lang="en-US" dirty="0"/>
           </a:p>
@@ -1953,19 +1905,12 @@
           <a:p>
             <a:fld id="{D57F1E4F-1CFF-5643-939E-217C01CDF565}" type="slidenum">
               <a:rPr lang="en-US" smtClean="0"/>
-              <a:pPr/>
-              <a:t>‹nº›</a:t>
             </a:fld>
             <a:endParaRPr lang="en-US" dirty="0"/>
           </a:p>
         </p:txBody>
       </p:sp>
     </p:spTree>
-    <p:extLst>
-      <p:ext uri="{BB962C8B-B14F-4D97-AF65-F5344CB8AC3E}">
-        <p14:creationId xmlns:p14="http://schemas.microsoft.com/office/powerpoint/2010/main" val="1058215728"/>
-      </p:ext>
-    </p:extLst>
   </p:cSld>
   <p:clrMapOvr>
     <a:masterClrMapping/>
@@ -2149,6 +2094,7 @@
               <a:rPr lang="en-US"/>
               <a:t>Click to edit Master text styles</a:t>
             </a:r>
+            <a:endParaRPr lang="en-US"/>
           </a:p>
           <a:p>
             <a:pPr lvl="1"/>
@@ -2156,6 +2102,7 @@
               <a:rPr lang="en-US"/>
               <a:t>Second level</a:t>
             </a:r>
+            <a:endParaRPr lang="en-US"/>
           </a:p>
           <a:p>
             <a:pPr lvl="2"/>
@@ -2163,6 +2110,7 @@
               <a:rPr lang="en-US"/>
               <a:t>Third level</a:t>
             </a:r>
+            <a:endParaRPr lang="en-US"/>
           </a:p>
           <a:p>
             <a:pPr lvl="3"/>
@@ -2170,6 +2118,7 @@
               <a:rPr lang="en-US"/>
               <a:t>Fourth level</a:t>
             </a:r>
+            <a:endParaRPr lang="en-US"/>
           </a:p>
           <a:p>
             <a:pPr lvl="4"/>
@@ -2249,6 +2198,7 @@
               <a:rPr lang="en-US"/>
               <a:t>Click to edit Master text styles</a:t>
             </a:r>
+            <a:endParaRPr lang="en-US"/>
           </a:p>
         </p:txBody>
       </p:sp>
@@ -2269,8 +2219,6 @@
           <a:p>
             <a:fld id="{D0DF5E60-9974-AC48-9591-99C2BB44B7CF}" type="datetimeFigureOut">
               <a:rPr lang="en-US" smtClean="0"/>
-              <a:pPr/>
-              <a:t>3/31/2021</a:t>
             </a:fld>
             <a:endParaRPr lang="en-US" dirty="0"/>
           </a:p>
@@ -2329,19 +2277,12 @@
           <a:p>
             <a:fld id="{D57F1E4F-1CFF-5643-939E-217C01CDF565}" type="slidenum">
               <a:rPr lang="en-US" smtClean="0"/>
-              <a:pPr/>
-              <a:t>‹nº›</a:t>
             </a:fld>
             <a:endParaRPr lang="en-US" dirty="0"/>
           </a:p>
         </p:txBody>
       </p:sp>
     </p:spTree>
-    <p:extLst>
-      <p:ext uri="{BB962C8B-B14F-4D97-AF65-F5344CB8AC3E}">
-        <p14:creationId xmlns:p14="http://schemas.microsoft.com/office/powerpoint/2010/main" val="3460488568"/>
-      </p:ext>
-    </p:extLst>
   </p:cSld>
   <p:clrMapOvr>
     <a:masterClrMapping/>
@@ -2595,6 +2536,7 @@
               <a:rPr lang="en-US"/>
               <a:t>Click to edit Master text styles</a:t>
             </a:r>
+            <a:endParaRPr lang="en-US"/>
           </a:p>
         </p:txBody>
       </p:sp>
@@ -2630,8 +2572,6 @@
           <a:p>
             <a:fld id="{09B482E8-6E0E-1B4F-B1FD-C69DB9E858D9}" type="datetimeFigureOut">
               <a:rPr lang="en-US" smtClean="0"/>
-              <a:pPr/>
-              <a:t>3/31/2021</a:t>
             </a:fld>
             <a:endParaRPr lang="en-US" dirty="0"/>
           </a:p>
@@ -2690,19 +2630,12 @@
           <a:p>
             <a:fld id="{D57F1E4F-1CFF-5643-939E-217C01CDF565}" type="slidenum">
               <a:rPr lang="en-US" smtClean="0"/>
-              <a:pPr/>
-              <a:t>‹nº›</a:t>
             </a:fld>
             <a:endParaRPr lang="en-US" dirty="0"/>
           </a:p>
         </p:txBody>
       </p:sp>
     </p:spTree>
-    <p:extLst>
-      <p:ext uri="{BB962C8B-B14F-4D97-AF65-F5344CB8AC3E}">
-        <p14:creationId xmlns:p14="http://schemas.microsoft.com/office/powerpoint/2010/main" val="166628395"/>
-      </p:ext>
-    </p:extLst>
   </p:cSld>
   <p:clrMapOvr>
     <a:masterClrMapping/>
@@ -2810,6 +2743,7 @@
               <a:rPr lang="en-US"/>
               <a:t>Click to edit Master text styles</a:t>
             </a:r>
+            <a:endParaRPr lang="en-US"/>
           </a:p>
           <a:p>
             <a:pPr lvl="1"/>
@@ -2817,6 +2751,7 @@
               <a:rPr lang="en-US"/>
               <a:t>Second level</a:t>
             </a:r>
+            <a:endParaRPr lang="en-US"/>
           </a:p>
           <a:p>
             <a:pPr lvl="2"/>
@@ -2824,6 +2759,7 @@
               <a:rPr lang="en-US"/>
               <a:t>Third level</a:t>
             </a:r>
+            <a:endParaRPr lang="en-US"/>
           </a:p>
           <a:p>
             <a:pPr lvl="3"/>
@@ -2831,6 +2767,7 @@
               <a:rPr lang="en-US"/>
               <a:t>Fourth level</a:t>
             </a:r>
+            <a:endParaRPr lang="en-US"/>
           </a:p>
           <a:p>
             <a:pPr lvl="4"/>
@@ -2877,8 +2814,6 @@
           <a:p>
             <a:fld id="{09B482E8-6E0E-1B4F-B1FD-C69DB9E858D9}" type="datetimeFigureOut">
               <a:rPr lang="en-US" smtClean="0"/>
-              <a:pPr/>
-              <a:t>3/31/2021</a:t>
             </a:fld>
             <a:endParaRPr lang="en-US" dirty="0"/>
           </a:p>
@@ -2961,33 +2896,26 @@
           <a:p>
             <a:fld id="{D57F1E4F-1CFF-5643-939E-217C01CDF565}" type="slidenum">
               <a:rPr lang="en-US" smtClean="0"/>
-              <a:pPr/>
-              <a:t>‹nº›</a:t>
             </a:fld>
             <a:endParaRPr lang="en-US" dirty="0"/>
           </a:p>
         </p:txBody>
       </p:sp>
     </p:spTree>
-    <p:extLst>
-      <p:ext uri="{BB962C8B-B14F-4D97-AF65-F5344CB8AC3E}">
-        <p14:creationId xmlns:p14="http://schemas.microsoft.com/office/powerpoint/2010/main" val="1783492698"/>
-      </p:ext>
-    </p:extLst>
   </p:cSld>
   <p:clrMap bg1="lt1" tx1="dk1" bg2="lt2" tx2="dk2" accent1="accent1" accent2="accent2" accent3="accent3" accent4="accent4" accent5="accent5" accent6="accent6" hlink="hlink" folHlink="folHlink"/>
   <p:sldLayoutIdLst>
-    <p:sldLayoutId id="2147483734" r:id="rId1"/>
-    <p:sldLayoutId id="2147483735" r:id="rId2"/>
-    <p:sldLayoutId id="2147483736" r:id="rId3"/>
-    <p:sldLayoutId id="2147483737" r:id="rId4"/>
-    <p:sldLayoutId id="2147483738" r:id="rId5"/>
-    <p:sldLayoutId id="2147483739" r:id="rId6"/>
-    <p:sldLayoutId id="2147483740" r:id="rId7"/>
-    <p:sldLayoutId id="2147483741" r:id="rId8"/>
-    <p:sldLayoutId id="2147483742" r:id="rId9"/>
-    <p:sldLayoutId id="2147483743" r:id="rId10"/>
-    <p:sldLayoutId id="2147483744" r:id="rId11"/>
+    <p:sldLayoutId id="2147483649" r:id="rId1"/>
+    <p:sldLayoutId id="2147483650" r:id="rId2"/>
+    <p:sldLayoutId id="2147483651" r:id="rId3"/>
+    <p:sldLayoutId id="2147483652" r:id="rId4"/>
+    <p:sldLayoutId id="2147483653" r:id="rId5"/>
+    <p:sldLayoutId id="2147483654" r:id="rId6"/>
+    <p:sldLayoutId id="2147483655" r:id="rId7"/>
+    <p:sldLayoutId id="2147483656" r:id="rId8"/>
+    <p:sldLayoutId id="2147483657" r:id="rId9"/>
+    <p:sldLayoutId id="2147483658" r:id="rId10"/>
+    <p:sldLayoutId id="2147483659" r:id="rId11"/>
   </p:sldLayoutIdLst>
   <p:hf sldNum="0" hdr="0" ftr="0" dt="0"/>
   <p:txStyles>
@@ -3321,7 +3249,7 @@
     <p:bg>
       <p:bgPr>
         <a:blipFill dpi="0" rotWithShape="1">
-          <a:blip r:embed="rId2">
+          <a:blip r:embed="rId1">
             <a:lum/>
           </a:blip>
           <a:srcRect/>
@@ -3348,16 +3276,8 @@
       </p:grpSpPr>
       <p:sp>
         <p:nvSpPr>
-          <p:cNvPr id="4" name="Title 1">
-            <a:extLst>
-              <a:ext uri="{FF2B5EF4-FFF2-40B4-BE49-F238E27FC236}">
-                <a16:creationId xmlns:a16="http://schemas.microsoft.com/office/drawing/2014/main" xmlns="" id="{854162F5-84C3-E248-B56A-B760B2963C40}"/>
-              </a:ext>
-            </a:extLst>
-          </p:cNvPr>
-          <p:cNvSpPr txBox="1">
-            <a:spLocks/>
-          </p:cNvSpPr>
+          <p:cNvPr id="4" name="Title 1"/>
+          <p:cNvSpPr txBox="1"/>
           <p:nvPr/>
         </p:nvSpPr>
         <p:spPr bwMode="blackWhite">
@@ -3406,15 +3326,11 @@
               <a:rPr lang="x-none" sz="2400" dirty="0"/>
               <a:t>CONTROLANDO VERSÕES COM GIT E GITHUB</a:t>
             </a:r>
+            <a:endParaRPr lang="x-none" sz="2400" dirty="0"/>
           </a:p>
         </p:txBody>
       </p:sp>
     </p:spTree>
-    <p:extLst>
-      <p:ext uri="{BB962C8B-B14F-4D97-AF65-F5344CB8AC3E}">
-        <p14:creationId xmlns:p14="http://schemas.microsoft.com/office/powerpoint/2010/main" val="3427182226"/>
-      </p:ext>
-    </p:extLst>
   </p:cSld>
   <p:clrMapOvr>
     <a:masterClrMapping/>
@@ -3451,13 +3367,7 @@
       </p:grpSpPr>
       <p:sp>
         <p:nvSpPr>
-          <p:cNvPr id="2" name="Title 1">
-            <a:extLst>
-              <a:ext uri="{FF2B5EF4-FFF2-40B4-BE49-F238E27FC236}">
-                <a16:creationId xmlns:a16="http://schemas.microsoft.com/office/drawing/2014/main" xmlns="" id="{73FD4F77-028A-7A47-BC41-2C419FC56E27}"/>
-              </a:ext>
-            </a:extLst>
-          </p:cNvPr>
+          <p:cNvPr id="2" name="Title 1"/>
           <p:cNvSpPr>
             <a:spLocks noGrp="1"/>
           </p:cNvSpPr>
@@ -3485,20 +3395,14 @@
       </p:sp>
       <p:pic>
         <p:nvPicPr>
-          <p:cNvPr id="1026" name="Picture 2" descr="Git na prática — Parte 1 (Subindo projeto para o github).">
-            <a:extLst>
-              <a:ext uri="{FF2B5EF4-FFF2-40B4-BE49-F238E27FC236}">
-                <a16:creationId xmlns:a16="http://schemas.microsoft.com/office/drawing/2014/main" xmlns="" id="{C41C7762-29AF-DE4A-8B75-0AA40134A4CA}"/>
-              </a:ext>
-            </a:extLst>
-          </p:cNvPr>
+          <p:cNvPr id="1026" name="Picture 2" descr="Git na prática — Parte 1 (Subindo projeto para o github)."/>
           <p:cNvPicPr>
             <a:picLocks noChangeAspect="1" noChangeArrowheads="1"/>
           </p:cNvPicPr>
           <p:nvPr/>
         </p:nvPicPr>
         <p:blipFill>
-          <a:blip r:embed="rId2">
+          <a:blip r:embed="rId1">
             <a:extLst>
               <a:ext uri="{28A0092B-C50C-407E-A947-70E740481C1C}">
                 <a14:useLocalDpi xmlns:a14="http://schemas.microsoft.com/office/drawing/2010/main" val="0"/>
@@ -3531,11 +3435,6 @@
         </p:spPr>
       </p:pic>
     </p:spTree>
-    <p:extLst>
-      <p:ext uri="{BB962C8B-B14F-4D97-AF65-F5344CB8AC3E}">
-        <p14:creationId xmlns:p14="http://schemas.microsoft.com/office/powerpoint/2010/main" val="2526184820"/>
-      </p:ext>
-    </p:extLst>
   </p:cSld>
   <p:clrMapOvr>
     <a:masterClrMapping/>
@@ -3562,13 +3461,7 @@
       </p:grpSpPr>
       <p:sp>
         <p:nvSpPr>
-          <p:cNvPr id="6" name="TextBox 5">
-            <a:extLst>
-              <a:ext uri="{FF2B5EF4-FFF2-40B4-BE49-F238E27FC236}">
-                <a16:creationId xmlns:a16="http://schemas.microsoft.com/office/drawing/2014/main" xmlns="" id="{D5751BA7-3065-D045-A3E0-72C84756D1B7}"/>
-              </a:ext>
-            </a:extLst>
-          </p:cNvPr>
+          <p:cNvPr id="6" name="TextBox 5"/>
           <p:cNvSpPr txBox="1"/>
           <p:nvPr/>
         </p:nvSpPr>
@@ -3597,6 +3490,7 @@
               <a:rPr lang="pt-BR" sz="3200" dirty="0" smtClean="0"/>
               <a:t>Nome: Paulo Alexandre S. c. da Fonseca</a:t>
             </a:r>
+            <a:endParaRPr lang="pt-BR" sz="3200" dirty="0" smtClean="0"/>
           </a:p>
           <a:p>
             <a:pPr algn="just">
@@ -3614,7 +3508,7 @@
             </a:r>
             <a:r>
               <a:rPr lang="pt-BR" sz="3200" dirty="0" smtClean="0">
-                <a:hlinkClick r:id="rId2"/>
+                <a:hlinkClick r:id="rId1"/>
               </a:rPr>
               <a:t>paulo.fonseca@uniron.edu.br</a:t>
             </a:r>
@@ -3684,7 +3578,7 @@
           <p:nvPr/>
         </p:nvPicPr>
         <p:blipFill>
-          <a:blip r:embed="rId3">
+          <a:blip r:embed="rId2">
             <a:extLst>
               <a:ext uri="{28A0092B-C50C-407E-A947-70E740481C1C}">
                 <a14:useLocalDpi xmlns:a14="http://schemas.microsoft.com/office/drawing/2010/main" val="0"/>
@@ -3706,11 +3600,6 @@
         </p:spPr>
       </p:pic>
     </p:spTree>
-    <p:extLst>
-      <p:ext uri="{BB962C8B-B14F-4D97-AF65-F5344CB8AC3E}">
-        <p14:creationId xmlns:p14="http://schemas.microsoft.com/office/powerpoint/2010/main" val="1104236657"/>
-      </p:ext>
-    </p:extLst>
   </p:cSld>
   <p:clrMapOvr>
     <a:masterClrMapping/>
@@ -3737,20 +3626,14 @@
       </p:grpSpPr>
       <p:sp>
         <p:nvSpPr>
-          <p:cNvPr id="6" name="TextBox 5">
-            <a:extLst>
-              <a:ext uri="{FF2B5EF4-FFF2-40B4-BE49-F238E27FC236}">
-                <a16:creationId xmlns:a16="http://schemas.microsoft.com/office/drawing/2014/main" xmlns="" id="{D5751BA7-3065-D045-A3E0-72C84756D1B7}"/>
-              </a:ext>
-            </a:extLst>
-          </p:cNvPr>
+          <p:cNvPr id="6" name="TextBox 5"/>
           <p:cNvSpPr txBox="1"/>
           <p:nvPr/>
         </p:nvSpPr>
         <p:spPr>
           <a:xfrm>
             <a:off x="437882" y="1490680"/>
-            <a:ext cx="8401317" cy="4031873"/>
+            <a:ext cx="8401317" cy="4030980"/>
           </a:xfrm>
           <a:prstGeom prst="rect">
             <a:avLst/>
@@ -3770,8 +3653,9 @@
             </a:pPr>
             <a:r>
               <a:rPr lang="pt-BR" sz="3200" dirty="0" smtClean="0"/>
-              <a:t>Nome:</a:t>
-            </a:r>
+              <a:t>Nome:Antônio Carlos Gomes Tabosa</a:t>
+            </a:r>
+            <a:endParaRPr lang="pt-BR" sz="3200" dirty="0" smtClean="0"/>
           </a:p>
           <a:p>
             <a:pPr algn="just">
@@ -3785,8 +3669,9 @@
             </a:r>
             <a:r>
               <a:rPr lang="pt-BR" sz="3200" dirty="0" smtClean="0"/>
-              <a:t>: </a:t>
-            </a:r>
+              <a:t>: Antonio.c.g.tabosa6838@gmail.com</a:t>
+            </a:r>
+            <a:endParaRPr lang="pt-BR" sz="3200" dirty="0" smtClean="0"/>
           </a:p>
           <a:p>
             <a:pPr algn="just">
@@ -3824,8 +3709,8 @@
         </p:nvSpPr>
         <p:spPr>
           <a:xfrm>
-            <a:off x="437883" y="11655"/>
-            <a:ext cx="8203842" cy="902745"/>
+            <a:off x="1602870" y="302387"/>
+            <a:ext cx="5937755" cy="1188720"/>
           </a:xfrm>
         </p:spPr>
         <p:txBody>
@@ -3847,12 +3732,33 @@
           </a:p>
         </p:txBody>
       </p:sp>
+      <p:pic>
+        <p:nvPicPr>
+          <p:cNvPr id="2" name="Espaço Reservado para Conteúdo 1" descr="20210217_233159_526"/>
+          <p:cNvPicPr>
+            <a:picLocks noChangeAspect="1"/>
+          </p:cNvPicPr>
+          <p:nvPr>
+            <p:ph idx="1"/>
+          </p:nvPr>
+        </p:nvPicPr>
+        <p:blipFill>
+          <a:blip r:embed="rId1"/>
+          <a:stretch>
+            <a:fillRect/>
+          </a:stretch>
+        </p:blipFill>
+        <p:spPr>
+          <a:xfrm>
+            <a:off x="6460490" y="3524885"/>
+            <a:ext cx="1968500" cy="2343785"/>
+          </a:xfrm>
+          <a:prstGeom prst="rect">
+            <a:avLst/>
+          </a:prstGeom>
+        </p:spPr>
+      </p:pic>
     </p:spTree>
-    <p:extLst>
-      <p:ext uri="{BB962C8B-B14F-4D97-AF65-F5344CB8AC3E}">
-        <p14:creationId xmlns:p14="http://schemas.microsoft.com/office/powerpoint/2010/main" val="1239389668"/>
-      </p:ext>
-    </p:extLst>
   </p:cSld>
   <p:clrMapOvr>
     <a:masterClrMapping/>
@@ -3903,7 +3809,7 @@
     </a:clrScheme>
     <a:fontScheme name="Parcel">
       <a:majorFont>
-        <a:latin typeface="Gill Sans MT" panose="020B0502020104020203"/>
+        <a:latin typeface="Gill Sans MT"/>
         <a:ea typeface=""/>
         <a:cs typeface=""/>
         <a:font script="Grek" typeface="Corbel"/>
@@ -3940,7 +3846,7 @@
         <a:font script="Geor" typeface="Sylfaen"/>
       </a:majorFont>
       <a:minorFont>
-        <a:latin typeface="Gill Sans MT" panose="020B0502020104020203"/>
+        <a:latin typeface="Gill Sans MT"/>
         <a:ea typeface=""/>
         <a:cs typeface=""/>
         <a:font script="Grek" typeface="Corbel"/>
@@ -4110,11 +4016,9 @@
       </a:bgFillStyleLst>
     </a:fmtScheme>
   </a:themeElements>
-  <a:objectDefaults/>
-  <a:extraClrSchemeLst/>
   <a:extLst>
     <a:ext uri="{05A4C25C-085E-4340-85A3-A5531E510DB2}">
-      <thm15:themeFamily xmlns:thm15="http://schemas.microsoft.com/office/thememl/2012/main" name="Parcel" id="{8BEC4385-4EB9-4D53-BFB5-0EA123736B6D}" vid="{4DB32801-28C0-48B0-8C1D-A9A58613615A}"/>
+      <thm15:themeFamily xmlns:thm15="http://schemas.microsoft.com/office/thememl/2012/main" name="Office Theme" id="{62F939B6-93AF-4DB8-9C6B-D6C7DFDC589F}" vid="{4A3C46E8-61CC-4603-A589-7422A47A8E4A}"/>
     </a:ext>
   </a:extLst>
 </a:theme>

</xml_diff>

<commit_message>
Corrigido posicionamento de dados do alunos Antonio
</commit_message>
<xml_diff>
--- a/Atividade de controle de versoes.pptx
+++ b/Atividade de controle de versoes.pptx
@@ -5,10 +5,10 @@
     <p:sldMasterId id="2147483648" r:id="rId1"/>
   </p:sldMasterIdLst>
   <p:sldIdLst>
-    <p:sldId id="256" r:id="rId3"/>
-    <p:sldId id="264" r:id="rId4"/>
-    <p:sldId id="257" r:id="rId5"/>
-    <p:sldId id="265" r:id="rId6"/>
+    <p:sldId id="256" r:id="rId2"/>
+    <p:sldId id="264" r:id="rId3"/>
+    <p:sldId id="257" r:id="rId4"/>
+    <p:sldId id="265" r:id="rId5"/>
   </p:sldIdLst>
   <p:sldSz cx="9144000" cy="6858000" type="screen4x3"/>
   <p:notesSz cx="6858000" cy="9144000"/>
@@ -107,6 +107,11 @@
       </a:defRPr>
     </a:lvl9pPr>
   </p:defaultTextStyle>
+  <p:extLst>
+    <p:ext uri="{EFAFB233-063F-42B5-8137-9DF3F51BA10A}">
+      <p15:sldGuideLst xmlns:p15="http://schemas.microsoft.com/office/powerpoint/2012/main"/>
+    </p:ext>
+  </p:extLst>
 </p:presentation>
 </file>
 
@@ -273,6 +278,7 @@
           <a:p>
             <a:fld id="{08B9EBBA-996F-894A-B54A-D6246ED52CEA}" type="datetimeFigureOut">
               <a:rPr lang="en-US" smtClean="0"/>
+              <a:t>4/7/2021</a:t>
             </a:fld>
             <a:endParaRPr lang="en-US" dirty="0"/>
           </a:p>
@@ -314,6 +320,7 @@
           <a:p>
             <a:fld id="{D57F1E4F-1CFF-5643-939E-217C01CDF565}" type="slidenum">
               <a:rPr lang="en-US" smtClean="0"/>
+              <a:t>‹nº›</a:t>
             </a:fld>
             <a:endParaRPr lang="en-US" dirty="0"/>
           </a:p>
@@ -387,7 +394,6 @@
               <a:rPr lang="en-US"/>
               <a:t>Click to edit Master text styles</a:t>
             </a:r>
-            <a:endParaRPr lang="en-US"/>
           </a:p>
           <a:p>
             <a:pPr lvl="1"/>
@@ -395,7 +401,6 @@
               <a:rPr lang="en-US"/>
               <a:t>Second level</a:t>
             </a:r>
-            <a:endParaRPr lang="en-US"/>
           </a:p>
           <a:p>
             <a:pPr lvl="2"/>
@@ -403,7 +408,6 @@
               <a:rPr lang="en-US"/>
               <a:t>Third level</a:t>
             </a:r>
-            <a:endParaRPr lang="en-US"/>
           </a:p>
           <a:p>
             <a:pPr lvl="3"/>
@@ -411,7 +415,6 @@
               <a:rPr lang="en-US"/>
               <a:t>Fourth level</a:t>
             </a:r>
-            <a:endParaRPr lang="en-US"/>
           </a:p>
           <a:p>
             <a:pPr lvl="4"/>
@@ -440,6 +443,7 @@
           <a:p>
             <a:fld id="{C6C52C72-DE31-F449-A4ED-4C594FD91407}" type="datetimeFigureOut">
               <a:rPr lang="en-US" smtClean="0"/>
+              <a:t>4/7/2021</a:t>
             </a:fld>
             <a:endParaRPr lang="en-US" dirty="0"/>
           </a:p>
@@ -481,6 +485,7 @@
           <a:p>
             <a:fld id="{D57F1E4F-1CFF-5643-939E-217C01CDF565}" type="slidenum">
               <a:rPr lang="en-US" smtClean="0"/>
+              <a:t>‹nº›</a:t>
             </a:fld>
             <a:endParaRPr lang="en-US" dirty="0"/>
           </a:p>
@@ -564,7 +569,6 @@
               <a:rPr lang="en-US"/>
               <a:t>Click to edit Master text styles</a:t>
             </a:r>
-            <a:endParaRPr lang="en-US"/>
           </a:p>
           <a:p>
             <a:pPr lvl="1"/>
@@ -572,7 +576,6 @@
               <a:rPr lang="en-US"/>
               <a:t>Second level</a:t>
             </a:r>
-            <a:endParaRPr lang="en-US"/>
           </a:p>
           <a:p>
             <a:pPr lvl="2"/>
@@ -580,7 +583,6 @@
               <a:rPr lang="en-US"/>
               <a:t>Third level</a:t>
             </a:r>
-            <a:endParaRPr lang="en-US"/>
           </a:p>
           <a:p>
             <a:pPr lvl="3"/>
@@ -588,7 +590,6 @@
               <a:rPr lang="en-US"/>
               <a:t>Fourth level</a:t>
             </a:r>
-            <a:endParaRPr lang="en-US"/>
           </a:p>
           <a:p>
             <a:pPr lvl="4"/>
@@ -617,6 +618,7 @@
           <a:p>
             <a:fld id="{ED62726E-379B-B349-9EED-81ED093FA806}" type="datetimeFigureOut">
               <a:rPr lang="en-US" smtClean="0"/>
+              <a:t>4/7/2021</a:t>
             </a:fld>
             <a:endParaRPr lang="en-US" dirty="0"/>
           </a:p>
@@ -658,6 +660,7 @@
           <a:p>
             <a:fld id="{D57F1E4F-1CFF-5643-939E-217C01CDF565}" type="slidenum">
               <a:rPr lang="en-US" smtClean="0"/>
+              <a:t>‹nº›</a:t>
             </a:fld>
             <a:endParaRPr lang="en-US" dirty="0"/>
           </a:p>
@@ -731,7 +734,6 @@
               <a:rPr lang="en-US"/>
               <a:t>Click to edit Master text styles</a:t>
             </a:r>
-            <a:endParaRPr lang="en-US"/>
           </a:p>
           <a:p>
             <a:pPr lvl="1"/>
@@ -739,7 +741,6 @@
               <a:rPr lang="en-US"/>
               <a:t>Second level</a:t>
             </a:r>
-            <a:endParaRPr lang="en-US"/>
           </a:p>
           <a:p>
             <a:pPr lvl="2"/>
@@ -747,7 +748,6 @@
               <a:rPr lang="en-US"/>
               <a:t>Third level</a:t>
             </a:r>
-            <a:endParaRPr lang="en-US"/>
           </a:p>
           <a:p>
             <a:pPr lvl="3"/>
@@ -755,7 +755,6 @@
               <a:rPr lang="en-US"/>
               <a:t>Fourth level</a:t>
             </a:r>
-            <a:endParaRPr lang="en-US"/>
           </a:p>
           <a:p>
             <a:pPr lvl="4"/>
@@ -784,6 +783,7 @@
           <a:p>
             <a:fld id="{9B3A1323-8D79-1946-B0D7-40001CF92E9D}" type="datetimeFigureOut">
               <a:rPr lang="en-US" smtClean="0"/>
+              <a:t>4/7/2021</a:t>
             </a:fld>
             <a:endParaRPr lang="en-US" dirty="0"/>
           </a:p>
@@ -825,6 +825,7 @@
           <a:p>
             <a:fld id="{D57F1E4F-1CFF-5643-939E-217C01CDF565}" type="slidenum">
               <a:rPr lang="en-US" smtClean="0"/>
+              <a:t>‹nº›</a:t>
             </a:fld>
             <a:endParaRPr lang="en-US" dirty="0"/>
           </a:p>
@@ -1025,7 +1026,6 @@
               <a:rPr lang="en-US"/>
               <a:t>Click to edit Master text styles</a:t>
             </a:r>
-            <a:endParaRPr lang="en-US"/>
           </a:p>
         </p:txBody>
       </p:sp>
@@ -1046,6 +1046,7 @@
           <a:p>
             <a:fld id="{8DFA1846-DA80-1C48-A609-854EA85C59AD}" type="datetimeFigureOut">
               <a:rPr lang="en-US" smtClean="0"/>
+              <a:t>4/7/2021</a:t>
             </a:fld>
             <a:endParaRPr lang="en-US" dirty="0"/>
           </a:p>
@@ -1087,6 +1088,7 @@
           <a:p>
             <a:fld id="{D57F1E4F-1CFF-5643-939E-217C01CDF565}" type="slidenum">
               <a:rPr lang="en-US" smtClean="0"/>
+              <a:t>‹nº›</a:t>
             </a:fld>
             <a:endParaRPr lang="en-US" dirty="0"/>
           </a:p>
@@ -1165,7 +1167,6 @@
               <a:rPr lang="en-US"/>
               <a:t>Click to edit Master text styles</a:t>
             </a:r>
-            <a:endParaRPr lang="en-US"/>
           </a:p>
           <a:p>
             <a:pPr lvl="1"/>
@@ -1173,7 +1174,6 @@
               <a:rPr lang="en-US"/>
               <a:t>Second level</a:t>
             </a:r>
-            <a:endParaRPr lang="en-US"/>
           </a:p>
           <a:p>
             <a:pPr lvl="2"/>
@@ -1181,7 +1181,6 @@
               <a:rPr lang="en-US"/>
               <a:t>Third level</a:t>
             </a:r>
-            <a:endParaRPr lang="en-US"/>
           </a:p>
           <a:p>
             <a:pPr lvl="3"/>
@@ -1189,7 +1188,6 @@
               <a:rPr lang="en-US"/>
               <a:t>Fourth level</a:t>
             </a:r>
-            <a:endParaRPr lang="en-US"/>
           </a:p>
           <a:p>
             <a:pPr lvl="4"/>
@@ -1226,7 +1224,6 @@
               <a:rPr lang="en-US"/>
               <a:t>Click to edit Master text styles</a:t>
             </a:r>
-            <a:endParaRPr lang="en-US"/>
           </a:p>
           <a:p>
             <a:pPr lvl="1"/>
@@ -1234,7 +1231,6 @@
               <a:rPr lang="en-US"/>
               <a:t>Second level</a:t>
             </a:r>
-            <a:endParaRPr lang="en-US"/>
           </a:p>
           <a:p>
             <a:pPr lvl="2"/>
@@ -1242,7 +1238,6 @@
               <a:rPr lang="en-US"/>
               <a:t>Third level</a:t>
             </a:r>
-            <a:endParaRPr lang="en-US"/>
           </a:p>
           <a:p>
             <a:pPr lvl="3"/>
@@ -1250,7 +1245,6 @@
               <a:rPr lang="en-US"/>
               <a:t>Fourth level</a:t>
             </a:r>
-            <a:endParaRPr lang="en-US"/>
           </a:p>
           <a:p>
             <a:pPr lvl="4"/>
@@ -1279,6 +1273,7 @@
           <a:p>
             <a:fld id="{57302355-E14B-8545-A8F8-0FE83CC9D524}" type="datetimeFigureOut">
               <a:rPr lang="en-US" smtClean="0"/>
+              <a:t>4/7/2021</a:t>
             </a:fld>
             <a:endParaRPr lang="en-US" dirty="0"/>
           </a:p>
@@ -1320,6 +1315,7 @@
           <a:p>
             <a:fld id="{D57F1E4F-1CFF-5643-939E-217C01CDF565}" type="slidenum">
               <a:rPr lang="en-US" smtClean="0"/>
+              <a:t>‹nº›</a:t>
             </a:fld>
             <a:endParaRPr lang="en-US" dirty="0"/>
           </a:p>
@@ -1420,7 +1416,6 @@
               <a:rPr lang="en-US"/>
               <a:t>Click to edit Master text styles</a:t>
             </a:r>
-            <a:endParaRPr lang="en-US"/>
           </a:p>
         </p:txBody>
       </p:sp>
@@ -1449,7 +1444,6 @@
               <a:rPr lang="en-US"/>
               <a:t>Click to edit Master text styles</a:t>
             </a:r>
-            <a:endParaRPr lang="en-US"/>
           </a:p>
           <a:p>
             <a:pPr lvl="1"/>
@@ -1457,7 +1451,6 @@
               <a:rPr lang="en-US"/>
               <a:t>Second level</a:t>
             </a:r>
-            <a:endParaRPr lang="en-US"/>
           </a:p>
           <a:p>
             <a:pPr lvl="2"/>
@@ -1465,7 +1458,6 @@
               <a:rPr lang="en-US"/>
               <a:t>Third level</a:t>
             </a:r>
-            <a:endParaRPr lang="en-US"/>
           </a:p>
           <a:p>
             <a:pPr lvl="3"/>
@@ -1473,7 +1465,6 @@
               <a:rPr lang="en-US"/>
               <a:t>Fourth level</a:t>
             </a:r>
-            <a:endParaRPr lang="en-US"/>
           </a:p>
           <a:p>
             <a:pPr lvl="4"/>
@@ -1514,7 +1505,6 @@
               <a:rPr lang="en-US"/>
               <a:t>Click to edit Master text styles</a:t>
             </a:r>
-            <a:endParaRPr lang="en-US"/>
           </a:p>
           <a:p>
             <a:pPr lvl="1"/>
@@ -1522,7 +1512,6 @@
               <a:rPr lang="en-US"/>
               <a:t>Second level</a:t>
             </a:r>
-            <a:endParaRPr lang="en-US"/>
           </a:p>
           <a:p>
             <a:pPr lvl="2"/>
@@ -1530,7 +1519,6 @@
               <a:rPr lang="en-US"/>
               <a:t>Third level</a:t>
             </a:r>
-            <a:endParaRPr lang="en-US"/>
           </a:p>
           <a:p>
             <a:pPr lvl="3"/>
@@ -1538,7 +1526,6 @@
               <a:rPr lang="en-US"/>
               <a:t>Fourth level</a:t>
             </a:r>
-            <a:endParaRPr lang="en-US"/>
           </a:p>
           <a:p>
             <a:pPr lvl="4"/>
@@ -1620,7 +1607,6 @@
               <a:rPr lang="en-US"/>
               <a:t>Click to edit Master text styles</a:t>
             </a:r>
-            <a:endParaRPr lang="en-US"/>
           </a:p>
         </p:txBody>
       </p:sp>
@@ -1641,6 +1627,7 @@
           <a:p>
             <a:fld id="{09B482E8-6E0E-1B4F-B1FD-C69DB9E858D9}" type="datetimeFigureOut">
               <a:rPr lang="en-US" smtClean="0"/>
+              <a:t>4/7/2021</a:t>
             </a:fld>
             <a:endParaRPr lang="en-US" dirty="0"/>
           </a:p>
@@ -1682,6 +1669,7 @@
           <a:p>
             <a:fld id="{D57F1E4F-1CFF-5643-939E-217C01CDF565}" type="slidenum">
               <a:rPr lang="en-US" smtClean="0"/>
+              <a:t>‹nº›</a:t>
             </a:fld>
             <a:endParaRPr lang="en-US" dirty="0"/>
           </a:p>
@@ -1776,6 +1764,7 @@
           <a:p>
             <a:fld id="{F13A34C8-038E-2045-AF43-DF7DBB8E0E9E}" type="datetimeFigureOut">
               <a:rPr lang="en-US" smtClean="0"/>
+              <a:t>4/7/2021</a:t>
             </a:fld>
             <a:endParaRPr lang="en-US" dirty="0"/>
           </a:p>
@@ -1817,6 +1806,7 @@
           <a:p>
             <a:fld id="{D57F1E4F-1CFF-5643-939E-217C01CDF565}" type="slidenum">
               <a:rPr lang="en-US" smtClean="0"/>
+              <a:t>‹nº›</a:t>
             </a:fld>
             <a:endParaRPr lang="en-US" dirty="0"/>
           </a:p>
@@ -1864,6 +1854,7 @@
           <a:p>
             <a:fld id="{8818C68F-D26B-8F47-958C-23B49CF8A634}" type="datetimeFigureOut">
               <a:rPr lang="en-US" smtClean="0"/>
+              <a:t>4/7/2021</a:t>
             </a:fld>
             <a:endParaRPr lang="en-US" dirty="0"/>
           </a:p>
@@ -1905,6 +1896,7 @@
           <a:p>
             <a:fld id="{D57F1E4F-1CFF-5643-939E-217C01CDF565}" type="slidenum">
               <a:rPr lang="en-US" smtClean="0"/>
+              <a:t>‹nº›</a:t>
             </a:fld>
             <a:endParaRPr lang="en-US" dirty="0"/>
           </a:p>
@@ -2094,7 +2086,6 @@
               <a:rPr lang="en-US"/>
               <a:t>Click to edit Master text styles</a:t>
             </a:r>
-            <a:endParaRPr lang="en-US"/>
           </a:p>
           <a:p>
             <a:pPr lvl="1"/>
@@ -2102,7 +2093,6 @@
               <a:rPr lang="en-US"/>
               <a:t>Second level</a:t>
             </a:r>
-            <a:endParaRPr lang="en-US"/>
           </a:p>
           <a:p>
             <a:pPr lvl="2"/>
@@ -2110,7 +2100,6 @@
               <a:rPr lang="en-US"/>
               <a:t>Third level</a:t>
             </a:r>
-            <a:endParaRPr lang="en-US"/>
           </a:p>
           <a:p>
             <a:pPr lvl="3"/>
@@ -2118,7 +2107,6 @@
               <a:rPr lang="en-US"/>
               <a:t>Fourth level</a:t>
             </a:r>
-            <a:endParaRPr lang="en-US"/>
           </a:p>
           <a:p>
             <a:pPr lvl="4"/>
@@ -2198,7 +2186,6 @@
               <a:rPr lang="en-US"/>
               <a:t>Click to edit Master text styles</a:t>
             </a:r>
-            <a:endParaRPr lang="en-US"/>
           </a:p>
         </p:txBody>
       </p:sp>
@@ -2219,6 +2206,7 @@
           <a:p>
             <a:fld id="{D0DF5E60-9974-AC48-9591-99C2BB44B7CF}" type="datetimeFigureOut">
               <a:rPr lang="en-US" smtClean="0"/>
+              <a:t>4/7/2021</a:t>
             </a:fld>
             <a:endParaRPr lang="en-US" dirty="0"/>
           </a:p>
@@ -2277,6 +2265,7 @@
           <a:p>
             <a:fld id="{D57F1E4F-1CFF-5643-939E-217C01CDF565}" type="slidenum">
               <a:rPr lang="en-US" smtClean="0"/>
+              <a:t>‹nº›</a:t>
             </a:fld>
             <a:endParaRPr lang="en-US" dirty="0"/>
           </a:p>
@@ -2536,7 +2525,6 @@
               <a:rPr lang="en-US"/>
               <a:t>Click to edit Master text styles</a:t>
             </a:r>
-            <a:endParaRPr lang="en-US"/>
           </a:p>
         </p:txBody>
       </p:sp>
@@ -2572,6 +2560,7 @@
           <a:p>
             <a:fld id="{09B482E8-6E0E-1B4F-B1FD-C69DB9E858D9}" type="datetimeFigureOut">
               <a:rPr lang="en-US" smtClean="0"/>
+              <a:t>4/7/2021</a:t>
             </a:fld>
             <a:endParaRPr lang="en-US" dirty="0"/>
           </a:p>
@@ -2630,6 +2619,7 @@
           <a:p>
             <a:fld id="{D57F1E4F-1CFF-5643-939E-217C01CDF565}" type="slidenum">
               <a:rPr lang="en-US" smtClean="0"/>
+              <a:t>‹nº›</a:t>
             </a:fld>
             <a:endParaRPr lang="en-US" dirty="0"/>
           </a:p>
@@ -2743,7 +2733,6 @@
               <a:rPr lang="en-US"/>
               <a:t>Click to edit Master text styles</a:t>
             </a:r>
-            <a:endParaRPr lang="en-US"/>
           </a:p>
           <a:p>
             <a:pPr lvl="1"/>
@@ -2751,7 +2740,6 @@
               <a:rPr lang="en-US"/>
               <a:t>Second level</a:t>
             </a:r>
-            <a:endParaRPr lang="en-US"/>
           </a:p>
           <a:p>
             <a:pPr lvl="2"/>
@@ -2759,7 +2747,6 @@
               <a:rPr lang="en-US"/>
               <a:t>Third level</a:t>
             </a:r>
-            <a:endParaRPr lang="en-US"/>
           </a:p>
           <a:p>
             <a:pPr lvl="3"/>
@@ -2767,7 +2754,6 @@
               <a:rPr lang="en-US"/>
               <a:t>Fourth level</a:t>
             </a:r>
-            <a:endParaRPr lang="en-US"/>
           </a:p>
           <a:p>
             <a:pPr lvl="4"/>
@@ -2814,6 +2800,7 @@
           <a:p>
             <a:fld id="{09B482E8-6E0E-1B4F-B1FD-C69DB9E858D9}" type="datetimeFigureOut">
               <a:rPr lang="en-US" smtClean="0"/>
+              <a:t>4/7/2021</a:t>
             </a:fld>
             <a:endParaRPr lang="en-US" dirty="0"/>
           </a:p>
@@ -2896,6 +2883,7 @@
           <a:p>
             <a:fld id="{D57F1E4F-1CFF-5643-939E-217C01CDF565}" type="slidenum">
               <a:rPr lang="en-US" smtClean="0"/>
+              <a:t>‹nº›</a:t>
             </a:fld>
             <a:endParaRPr lang="en-US" dirty="0"/>
           </a:p>
@@ -3249,7 +3237,7 @@
     <p:bg>
       <p:bgPr>
         <a:blipFill dpi="0" rotWithShape="1">
-          <a:blip r:embed="rId1">
+          <a:blip r:embed="rId2">
             <a:lum/>
           </a:blip>
           <a:srcRect/>
@@ -3326,7 +3314,6 @@
               <a:rPr lang="x-none" sz="2400" dirty="0"/>
               <a:t>CONTROLANDO VERSÕES COM GIT E GITHUB</a:t>
             </a:r>
-            <a:endParaRPr lang="x-none" sz="2400" dirty="0"/>
           </a:p>
         </p:txBody>
       </p:sp>
@@ -3402,7 +3389,7 @@
           <p:nvPr/>
         </p:nvPicPr>
         <p:blipFill>
-          <a:blip r:embed="rId1">
+          <a:blip r:embed="rId2">
             <a:extLst>
               <a:ext uri="{28A0092B-C50C-407E-A947-70E740481C1C}">
                 <a14:useLocalDpi xmlns:a14="http://schemas.microsoft.com/office/drawing/2010/main" val="0"/>
@@ -3490,7 +3477,6 @@
               <a:rPr lang="pt-BR" sz="3200" dirty="0" smtClean="0"/>
               <a:t>Nome: Paulo Alexandre S. c. da Fonseca</a:t>
             </a:r>
-            <a:endParaRPr lang="pt-BR" sz="3200" dirty="0" smtClean="0"/>
           </a:p>
           <a:p>
             <a:pPr algn="just">
@@ -3508,7 +3494,7 @@
             </a:r>
             <a:r>
               <a:rPr lang="pt-BR" sz="3200" dirty="0" smtClean="0">
-                <a:hlinkClick r:id="rId1"/>
+                <a:hlinkClick r:id="rId2"/>
               </a:rPr>
               <a:t>paulo.fonseca@uniron.edu.br</a:t>
             </a:r>
@@ -3578,7 +3564,7 @@
           <p:nvPr/>
         </p:nvPicPr>
         <p:blipFill>
-          <a:blip r:embed="rId2">
+          <a:blip r:embed="rId3">
             <a:extLst>
               <a:ext uri="{28A0092B-C50C-407E-A947-70E740481C1C}">
                 <a14:useLocalDpi xmlns:a14="http://schemas.microsoft.com/office/drawing/2010/main" val="0"/>
@@ -3653,9 +3639,16 @@
             </a:pPr>
             <a:r>
               <a:rPr lang="pt-BR" sz="3200" dirty="0" smtClean="0"/>
-              <a:t>Nome:Antônio Carlos Gomes Tabosa</a:t>
-            </a:r>
-            <a:endParaRPr lang="pt-BR" sz="3200" dirty="0" smtClean="0"/>
+              <a:t>Nome</a:t>
+            </a:r>
+            <a:r>
+              <a:rPr lang="pt-BR" sz="3200" dirty="0" smtClean="0"/>
+              <a:t>: Antônio </a:t>
+            </a:r>
+            <a:r>
+              <a:rPr lang="pt-BR" sz="3200" dirty="0" smtClean="0"/>
+              <a:t>Carlos Gomes Tabosa</a:t>
+            </a:r>
           </a:p>
           <a:p>
             <a:pPr algn="just">
@@ -3671,7 +3664,6 @@
               <a:rPr lang="pt-BR" sz="3200" dirty="0" smtClean="0"/>
               <a:t>: Antonio.c.g.tabosa6838@gmail.com</a:t>
             </a:r>
-            <a:endParaRPr lang="pt-BR" sz="3200" dirty="0" smtClean="0"/>
           </a:p>
           <a:p>
             <a:pPr algn="just">
@@ -3680,7 +3672,7 @@
               </a:lnSpc>
             </a:pPr>
             <a:r>
-              <a:rPr lang="pt-BR" sz="3200" smtClean="0"/>
+              <a:rPr lang="pt-BR" sz="3200" dirty="0" smtClean="0"/>
               <a:t>Foto:</a:t>
             </a:r>
             <a:endParaRPr lang="x-none" sz="3200" dirty="0"/>
@@ -3736,21 +3728,21 @@
         <p:nvPicPr>
           <p:cNvPr id="2" name="Espaço Reservado para Conteúdo 1" descr="20210217_233159_526"/>
           <p:cNvPicPr>
-            <a:picLocks noChangeAspect="1"/>
+            <a:picLocks noGrp="1" noChangeAspect="1"/>
           </p:cNvPicPr>
           <p:nvPr>
             <p:ph idx="1"/>
           </p:nvPr>
         </p:nvPicPr>
         <p:blipFill>
-          <a:blip r:embed="rId1"/>
+          <a:blip r:embed="rId2"/>
           <a:stretch>
             <a:fillRect/>
           </a:stretch>
         </p:blipFill>
         <p:spPr>
           <a:xfrm>
-            <a:off x="6460490" y="3524885"/>
+            <a:off x="3305166" y="3506170"/>
             <a:ext cx="1968500" cy="2343785"/>
           </a:xfrm>
           <a:prstGeom prst="rect">
@@ -4016,6 +4008,8 @@
       </a:bgFillStyleLst>
     </a:fmtScheme>
   </a:themeElements>
+  <a:objectDefaults/>
+  <a:extraClrSchemeLst/>
   <a:extLst>
     <a:ext uri="{05A4C25C-085E-4340-85A3-A5531E510DB2}">
       <thm15:themeFamily xmlns:thm15="http://schemas.microsoft.com/office/thememl/2012/main" name="Office Theme" id="{62F939B6-93AF-4DB8-9C6B-D6C7DFDC589F}" vid="{4A3C46E8-61CC-4603-A589-7422A47A8E4A}"/>

</xml_diff>